<commit_message>
goodness of the fit on SaveResults
</commit_message>
<xml_diff>
--- a/RADIANTE_Structure.pptx
+++ b/RADIANTE_Structure.pptx
@@ -3017,8 +3017,8 @@
         </p:nvSpPr>
         <p:spPr>
           <a:xfrm>
-            <a:off x="5129623" y="423351"/>
-            <a:ext cx="1335024" cy="548640"/>
+            <a:off x="4920326" y="393211"/>
+            <a:ext cx="1746857" cy="548640"/>
           </a:xfrm>
           <a:prstGeom prst="ellipse">
             <a:avLst/>
@@ -3062,7 +3062,15 @@
                   <a:schemeClr val="tx1"/>
                 </a:solidFill>
               </a:rPr>
-              <a:t>main.m</a:t>
+              <a:t>radiance</a:t>
+            </a:r>
+            <a:r>
+              <a:rPr lang="pt-PT" dirty="0" err="1" smtClean="0">
+                <a:solidFill>
+                  <a:schemeClr val="tx1"/>
+                </a:solidFill>
+              </a:rPr>
+              <a:t>.m</a:t>
             </a:r>
             <a:endParaRPr lang="pt-PT" dirty="0" smtClean="0">
               <a:solidFill>
@@ -3158,9 +3166,9 @@
           <p:nvPr/>
         </p:nvCxnSpPr>
         <p:spPr>
-          <a:xfrm flipH="1">
-            <a:off x="5795623" y="971991"/>
-            <a:ext cx="1512" cy="192024"/>
+          <a:xfrm>
+            <a:off x="5793755" y="941851"/>
+            <a:ext cx="1868" cy="222164"/>
           </a:xfrm>
           <a:prstGeom prst="line">
             <a:avLst/>
@@ -6950,11 +6958,6 @@
               </a:rPr>
               <a:t>BED</a:t>
             </a:r>
-            <a:endParaRPr lang="pt-PT" dirty="0" smtClean="0">
-              <a:solidFill>
-                <a:schemeClr val="tx1"/>
-              </a:solidFill>
-            </a:endParaRPr>
           </a:p>
           <a:p>
             <a:pPr algn="ctr"/>

</xml_diff>